<commit_message>
allerlei programmas en documenten periode 3
</commit_message>
<xml_diff>
--- a/presentatie/oefenpresentatie.pptx
+++ b/presentatie/oefenpresentatie.pptx
@@ -6,9 +6,10 @@
   </p:sldMasterIdLst>
   <p:sldIdLst>
     <p:sldId id="258" r:id="rId2"/>
-    <p:sldId id="256" r:id="rId3"/>
+    <p:sldId id="260" r:id="rId3"/>
     <p:sldId id="259" r:id="rId4"/>
-    <p:sldId id="257" r:id="rId5"/>
+    <p:sldId id="256" r:id="rId5"/>
+    <p:sldId id="257" r:id="rId6"/>
   </p:sldIdLst>
   <p:sldSz cx="12192000" cy="6858000"/>
   <p:notesSz cx="6858000" cy="9144000"/>
@@ -183,7 +184,7 @@
       <pc:sldMk xmlns:pc="http://schemas.microsoft.com/office/powerpoint/2013/main/command" cId="2380156319" sldId="257"/>
       <ac:spMk id="4" creationId="{09A8E930-AECC-4891-AC60-C6262CF1DA3E}"/>
       <ac:txMk cp="184" len="26">
-        <ac:context len="213" hash="3198145496"/>
+        <ac:context len="212" hash="3871278680"/>
       </ac:txMk>
     </ac:txMkLst>
     <p188:pos x="6740229" y="4564698"/>
@@ -348,7 +349,7 @@
           <a:p>
             <a:fld id="{F43EE9FE-8DA4-4B91-A243-EF5C3839A964}" type="datetimeFigureOut">
               <a:rPr lang="nl-NL" smtClean="0"/>
-              <a:t>18-1-2023</a:t>
+              <a:t>19-1-2023</a:t>
             </a:fld>
             <a:endParaRPr lang="nl-NL"/>
           </a:p>
@@ -546,7 +547,7 @@
           <a:p>
             <a:fld id="{F43EE9FE-8DA4-4B91-A243-EF5C3839A964}" type="datetimeFigureOut">
               <a:rPr lang="nl-NL" smtClean="0"/>
-              <a:t>18-1-2023</a:t>
+              <a:t>19-1-2023</a:t>
             </a:fld>
             <a:endParaRPr lang="nl-NL"/>
           </a:p>
@@ -754,7 +755,7 @@
           <a:p>
             <a:fld id="{F43EE9FE-8DA4-4B91-A243-EF5C3839A964}" type="datetimeFigureOut">
               <a:rPr lang="nl-NL" smtClean="0"/>
-              <a:t>18-1-2023</a:t>
+              <a:t>19-1-2023</a:t>
             </a:fld>
             <a:endParaRPr lang="nl-NL"/>
           </a:p>
@@ -952,7 +953,7 @@
           <a:p>
             <a:fld id="{F43EE9FE-8DA4-4B91-A243-EF5C3839A964}" type="datetimeFigureOut">
               <a:rPr lang="nl-NL" smtClean="0"/>
-              <a:t>18-1-2023</a:t>
+              <a:t>19-1-2023</a:t>
             </a:fld>
             <a:endParaRPr lang="nl-NL"/>
           </a:p>
@@ -1227,7 +1228,7 @@
           <a:p>
             <a:fld id="{F43EE9FE-8DA4-4B91-A243-EF5C3839A964}" type="datetimeFigureOut">
               <a:rPr lang="nl-NL" smtClean="0"/>
-              <a:t>18-1-2023</a:t>
+              <a:t>19-1-2023</a:t>
             </a:fld>
             <a:endParaRPr lang="nl-NL"/>
           </a:p>
@@ -1492,7 +1493,7 @@
           <a:p>
             <a:fld id="{F43EE9FE-8DA4-4B91-A243-EF5C3839A964}" type="datetimeFigureOut">
               <a:rPr lang="nl-NL" smtClean="0"/>
-              <a:t>18-1-2023</a:t>
+              <a:t>19-1-2023</a:t>
             </a:fld>
             <a:endParaRPr lang="nl-NL"/>
           </a:p>
@@ -1904,7 +1905,7 @@
           <a:p>
             <a:fld id="{F43EE9FE-8DA4-4B91-A243-EF5C3839A964}" type="datetimeFigureOut">
               <a:rPr lang="nl-NL" smtClean="0"/>
-              <a:t>18-1-2023</a:t>
+              <a:t>19-1-2023</a:t>
             </a:fld>
             <a:endParaRPr lang="nl-NL"/>
           </a:p>
@@ -2045,7 +2046,7 @@
           <a:p>
             <a:fld id="{F43EE9FE-8DA4-4B91-A243-EF5C3839A964}" type="datetimeFigureOut">
               <a:rPr lang="nl-NL" smtClean="0"/>
-              <a:t>18-1-2023</a:t>
+              <a:t>19-1-2023</a:t>
             </a:fld>
             <a:endParaRPr lang="nl-NL"/>
           </a:p>
@@ -2158,7 +2159,7 @@
           <a:p>
             <a:fld id="{F43EE9FE-8DA4-4B91-A243-EF5C3839A964}" type="datetimeFigureOut">
               <a:rPr lang="nl-NL" smtClean="0"/>
-              <a:t>18-1-2023</a:t>
+              <a:t>19-1-2023</a:t>
             </a:fld>
             <a:endParaRPr lang="nl-NL"/>
           </a:p>
@@ -2469,7 +2470,7 @@
           <a:p>
             <a:fld id="{F43EE9FE-8DA4-4B91-A243-EF5C3839A964}" type="datetimeFigureOut">
               <a:rPr lang="nl-NL" smtClean="0"/>
-              <a:t>18-1-2023</a:t>
+              <a:t>19-1-2023</a:t>
             </a:fld>
             <a:endParaRPr lang="nl-NL"/>
           </a:p>
@@ -2757,7 +2758,7 @@
           <a:p>
             <a:fld id="{F43EE9FE-8DA4-4B91-A243-EF5C3839A964}" type="datetimeFigureOut">
               <a:rPr lang="nl-NL" smtClean="0"/>
-              <a:t>18-1-2023</a:t>
+              <a:t>19-1-2023</a:t>
             </a:fld>
             <a:endParaRPr lang="nl-NL"/>
           </a:p>
@@ -2998,7 +2999,7 @@
           <a:p>
             <a:fld id="{F43EE9FE-8DA4-4B91-A243-EF5C3839A964}" type="datetimeFigureOut">
               <a:rPr lang="nl-NL" smtClean="0"/>
-              <a:t>18-1-2023</a:t>
+              <a:t>19-1-2023</a:t>
             </a:fld>
             <a:endParaRPr lang="nl-NL"/>
           </a:p>
@@ -3429,8 +3430,8 @@
         </p:nvSpPr>
         <p:spPr>
           <a:xfrm>
-            <a:off x="1663565" y="1005823"/>
-            <a:ext cx="1982804" cy="553998"/>
+            <a:off x="1663564" y="619743"/>
+            <a:ext cx="2571551" cy="707886"/>
           </a:xfrm>
           <a:prstGeom prst="rect">
             <a:avLst/>
@@ -3444,7 +3445,7 @@
           <a:lstStyle/>
           <a:p>
             <a:r>
-              <a:rPr lang="nl-NL" sz="3000" dirty="0"/>
+              <a:rPr lang="nl-NL" sz="4000" dirty="0"/>
               <a:t>Wiskunde</a:t>
             </a:r>
             <a:r>
@@ -3468,8 +3469,8 @@
         </p:nvSpPr>
         <p:spPr>
           <a:xfrm>
-            <a:off x="8690011" y="240449"/>
-            <a:ext cx="3108960" cy="553998"/>
+            <a:off x="8545633" y="1072130"/>
+            <a:ext cx="3108960" cy="461665"/>
           </a:xfrm>
           <a:prstGeom prst="rect">
             <a:avLst/>
@@ -3483,12 +3484,8 @@
           <a:lstStyle/>
           <a:p>
             <a:r>
-              <a:rPr lang="nl-NL" sz="3000" dirty="0"/>
-              <a:t>Bedrijfskunde</a:t>
-            </a:r>
-            <a:r>
-              <a:rPr lang="nl-NL" dirty="0"/>
-              <a:t> </a:t>
+              <a:rPr lang="nl-NL" sz="2400" dirty="0"/>
+              <a:t>Bedrijfskunde </a:t>
             </a:r>
           </a:p>
         </p:txBody>
@@ -3507,28 +3504,26 @@
         </p:nvSpPr>
         <p:spPr>
           <a:xfrm>
-            <a:off x="4742685" y="2059806"/>
+            <a:off x="4742685" y="2030930"/>
             <a:ext cx="2216380" cy="2261937"/>
           </a:xfrm>
           <a:prstGeom prst="ellipse">
             <a:avLst/>
           </a:prstGeom>
-          <a:noFill/>
+          <a:ln w="38100"/>
         </p:spPr>
         <p:style>
           <a:lnRef idx="2">
-            <a:schemeClr val="accent1">
-              <a:shade val="50000"/>
-            </a:schemeClr>
+            <a:schemeClr val="dk1"/>
           </a:lnRef>
           <a:fillRef idx="1">
-            <a:schemeClr val="accent1"/>
+            <a:schemeClr val="lt1"/>
           </a:fillRef>
           <a:effectRef idx="0">
-            <a:schemeClr val="accent1"/>
+            <a:schemeClr val="dk1"/>
           </a:effectRef>
           <a:fontRef idx="minor">
-            <a:schemeClr val="lt1"/>
+            <a:schemeClr val="dk1"/>
           </a:fontRef>
         </p:style>
         <p:txBody>
@@ -3536,42 +3531,6 @@
           <a:lstStyle/>
           <a:p>
             <a:pPr algn="ctr"/>
-            <a:r>
-              <a:rPr lang="nl-NL" sz="4000" dirty="0">
-                <a:solidFill>
-                  <a:schemeClr val="accent2">
-                    <a:lumMod val="75000"/>
-                  </a:schemeClr>
-                </a:solidFill>
-              </a:rPr>
-              <a:t>Make </a:t>
-            </a:r>
-          </a:p>
-          <a:p>
-            <a:pPr algn="ctr"/>
-            <a:r>
-              <a:rPr lang="nl-NL" sz="4000" dirty="0">
-                <a:solidFill>
-                  <a:schemeClr val="accent2">
-                    <a:lumMod val="75000"/>
-                  </a:schemeClr>
-                </a:solidFill>
-              </a:rPr>
-              <a:t>AI</a:t>
-            </a:r>
-          </a:p>
-          <a:p>
-            <a:pPr algn="ctr"/>
-            <a:r>
-              <a:rPr lang="nl-NL" sz="4000" dirty="0" err="1">
-                <a:solidFill>
-                  <a:schemeClr val="accent2">
-                    <a:lumMod val="75000"/>
-                  </a:schemeClr>
-                </a:solidFill>
-              </a:rPr>
-              <a:t>Work</a:t>
-            </a:r>
             <a:endParaRPr lang="nl-NL" sz="4000" dirty="0">
               <a:solidFill>
                 <a:schemeClr val="accent2">
@@ -3596,8 +3555,8 @@
         </p:nvSpPr>
         <p:spPr>
           <a:xfrm>
-            <a:off x="6633199" y="5529185"/>
-            <a:ext cx="2216380" cy="553998"/>
+            <a:off x="5351643" y="5669281"/>
+            <a:ext cx="1022958" cy="1015663"/>
           </a:xfrm>
           <a:prstGeom prst="rect">
             <a:avLst/>
@@ -3611,182 +3570,8 @@
           <a:lstStyle/>
           <a:p>
             <a:r>
-              <a:rPr lang="nl-NL" sz="3000" dirty="0"/>
-              <a:t>Informatica</a:t>
-            </a:r>
-          </a:p>
-        </p:txBody>
-      </p:sp>
-      <p:sp>
-        <p:nvSpPr>
-          <p:cNvPr id="7" name="Tekstvak 6">
-            <a:extLst>
-              <a:ext uri="{FF2B5EF4-FFF2-40B4-BE49-F238E27FC236}">
-                <a16:creationId xmlns:a16="http://schemas.microsoft.com/office/drawing/2014/main" id="{A9D4C730-4C46-4DDA-853E-7486FDFAD35D}"/>
-              </a:ext>
-            </a:extLst>
-          </p:cNvPr>
-          <p:cNvSpPr txBox="1"/>
-          <p:nvPr/>
-        </p:nvSpPr>
-        <p:spPr>
-          <a:xfrm>
-            <a:off x="5109729" y="909802"/>
-            <a:ext cx="1982804" cy="553998"/>
-          </a:xfrm>
-          <a:prstGeom prst="rect">
-            <a:avLst/>
-          </a:prstGeom>
-          <a:noFill/>
-        </p:spPr>
-        <p:txBody>
-          <a:bodyPr wrap="square" rtlCol="0">
-            <a:spAutoFit/>
-          </a:bodyPr>
-          <a:lstStyle/>
-          <a:p>
-            <a:r>
-              <a:rPr lang="nl-NL" sz="3000" dirty="0">
-                <a:solidFill>
-                  <a:schemeClr val="accent1">
-                    <a:lumMod val="75000"/>
-                  </a:schemeClr>
-                </a:solidFill>
-              </a:rPr>
-              <a:t>Project</a:t>
-            </a:r>
-            <a:endParaRPr lang="nl-NL" dirty="0"/>
-          </a:p>
-        </p:txBody>
-      </p:sp>
-      <p:sp>
-        <p:nvSpPr>
-          <p:cNvPr id="8" name="Tekstvak 7">
-            <a:extLst>
-              <a:ext uri="{FF2B5EF4-FFF2-40B4-BE49-F238E27FC236}">
-                <a16:creationId xmlns:a16="http://schemas.microsoft.com/office/drawing/2014/main" id="{C01EF6BA-1751-4C85-BF5F-1A8393D394AF}"/>
-              </a:ext>
-            </a:extLst>
-          </p:cNvPr>
-          <p:cNvSpPr txBox="1"/>
-          <p:nvPr/>
-        </p:nvSpPr>
-        <p:spPr>
-          <a:xfrm>
-            <a:off x="3193983" y="4744181"/>
-            <a:ext cx="1982804" cy="553998"/>
-          </a:xfrm>
-          <a:prstGeom prst="rect">
-            <a:avLst/>
-          </a:prstGeom>
-          <a:noFill/>
-        </p:spPr>
-        <p:txBody>
-          <a:bodyPr wrap="square" rtlCol="0">
-            <a:spAutoFit/>
-          </a:bodyPr>
-          <a:lstStyle/>
-          <a:p>
-            <a:r>
-              <a:rPr lang="nl-NL" sz="3000" dirty="0">
-                <a:solidFill>
-                  <a:schemeClr val="accent1">
-                    <a:lumMod val="75000"/>
-                  </a:schemeClr>
-                </a:solidFill>
-              </a:rPr>
-              <a:t>Presentatie</a:t>
-            </a:r>
-            <a:r>
-              <a:rPr lang="nl-NL" dirty="0"/>
-              <a:t> </a:t>
-            </a:r>
-          </a:p>
-        </p:txBody>
-      </p:sp>
-      <p:sp>
-        <p:nvSpPr>
-          <p:cNvPr id="9" name="Tekstvak 8">
-            <a:extLst>
-              <a:ext uri="{FF2B5EF4-FFF2-40B4-BE49-F238E27FC236}">
-                <a16:creationId xmlns:a16="http://schemas.microsoft.com/office/drawing/2014/main" id="{BAFBB04F-DAAC-4828-922E-9A534EDAB5EF}"/>
-              </a:ext>
-            </a:extLst>
-          </p:cNvPr>
-          <p:cNvSpPr txBox="1"/>
-          <p:nvPr/>
-        </p:nvSpPr>
-        <p:spPr>
-          <a:xfrm>
-            <a:off x="7640855" y="2936913"/>
-            <a:ext cx="1982804" cy="553998"/>
-          </a:xfrm>
-          <a:prstGeom prst="rect">
-            <a:avLst/>
-          </a:prstGeom>
-          <a:noFill/>
-        </p:spPr>
-        <p:txBody>
-          <a:bodyPr wrap="square" rtlCol="0">
-            <a:spAutoFit/>
-          </a:bodyPr>
-          <a:lstStyle/>
-          <a:p>
-            <a:r>
-              <a:rPr lang="nl-NL" sz="3000" dirty="0">
-                <a:solidFill>
-                  <a:schemeClr val="accent1">
-                    <a:lumMod val="75000"/>
-                  </a:schemeClr>
-                </a:solidFill>
-              </a:rPr>
-              <a:t>Practicum</a:t>
-            </a:r>
-            <a:endParaRPr lang="nl-NL" dirty="0"/>
-          </a:p>
-        </p:txBody>
-      </p:sp>
-      <p:sp>
-        <p:nvSpPr>
-          <p:cNvPr id="15" name="Tekstvak 14">
-            <a:extLst>
-              <a:ext uri="{FF2B5EF4-FFF2-40B4-BE49-F238E27FC236}">
-                <a16:creationId xmlns:a16="http://schemas.microsoft.com/office/drawing/2014/main" id="{1ADF31B7-DF74-4584-8BFD-D6F03F0333DC}"/>
-              </a:ext>
-            </a:extLst>
-          </p:cNvPr>
-          <p:cNvSpPr txBox="1"/>
-          <p:nvPr/>
-        </p:nvSpPr>
-        <p:spPr>
-          <a:xfrm>
-            <a:off x="2058839" y="3032421"/>
-            <a:ext cx="1982804" cy="553998"/>
-          </a:xfrm>
-          <a:prstGeom prst="rect">
-            <a:avLst/>
-          </a:prstGeom>
-          <a:noFill/>
-        </p:spPr>
-        <p:txBody>
-          <a:bodyPr wrap="square" rtlCol="0">
-            <a:spAutoFit/>
-          </a:bodyPr>
-          <a:lstStyle/>
-          <a:p>
-            <a:r>
-              <a:rPr lang="nl-NL" sz="3000" dirty="0">
-                <a:solidFill>
-                  <a:schemeClr val="accent1">
-                    <a:lumMod val="75000"/>
-                  </a:schemeClr>
-                </a:solidFill>
-              </a:rPr>
-              <a:t>College</a:t>
-            </a:r>
-            <a:r>
-              <a:rPr lang="nl-NL" dirty="0"/>
-              <a:t> </a:t>
+              <a:rPr lang="nl-NL" sz="6000" dirty="0"/>
+              <a:t>IT</a:t>
             </a:r>
           </a:p>
         </p:txBody>
@@ -3809,8 +3594,8 @@
         </p:nvCxnSpPr>
         <p:spPr>
           <a:xfrm>
-            <a:off x="2654967" y="1559821"/>
-            <a:ext cx="2412299" cy="831238"/>
+            <a:off x="2949340" y="1327629"/>
+            <a:ext cx="2117926" cy="1034554"/>
           </a:xfrm>
           <a:prstGeom prst="line">
             <a:avLst/>
@@ -3841,6 +3626,7 @@
             </a:extLst>
           </p:cNvPr>
           <p:cNvCxnSpPr>
+            <a:cxnSpLocks/>
             <a:stCxn id="4" idx="1"/>
             <a:endCxn id="5" idx="7"/>
           </p:cNvCxnSpPr>
@@ -3848,47 +3634,8 @@
         </p:nvCxnSpPr>
         <p:spPr>
           <a:xfrm flipH="1">
-            <a:off x="6634484" y="517448"/>
-            <a:ext cx="2055527" cy="1873611"/>
-          </a:xfrm>
-          <a:prstGeom prst="line">
-            <a:avLst/>
-          </a:prstGeom>
-        </p:spPr>
-        <p:style>
-          <a:lnRef idx="1">
-            <a:schemeClr val="accent1"/>
-          </a:lnRef>
-          <a:fillRef idx="0">
-            <a:schemeClr val="accent1"/>
-          </a:fillRef>
-          <a:effectRef idx="0">
-            <a:schemeClr val="accent1"/>
-          </a:effectRef>
-          <a:fontRef idx="minor">
-            <a:schemeClr val="tx1"/>
-          </a:fontRef>
-        </p:style>
-      </p:cxnSp>
-      <p:cxnSp>
-        <p:nvCxnSpPr>
-          <p:cNvPr id="14" name="Rechte verbindingslijn 13">
-            <a:extLst>
-              <a:ext uri="{FF2B5EF4-FFF2-40B4-BE49-F238E27FC236}">
-                <a16:creationId xmlns:a16="http://schemas.microsoft.com/office/drawing/2014/main" id="{DB7060F0-DB25-47C6-AA5A-5D2565734522}"/>
-              </a:ext>
-            </a:extLst>
-          </p:cNvPr>
-          <p:cNvCxnSpPr>
-            <a:stCxn id="9" idx="1"/>
-            <a:endCxn id="5" idx="6"/>
-          </p:cNvCxnSpPr>
-          <p:nvPr/>
-        </p:nvCxnSpPr>
-        <p:spPr>
-          <a:xfrm flipH="1" flipV="1">
-            <a:off x="6959065" y="3190775"/>
-            <a:ext cx="681790" cy="23137"/>
+            <a:off x="6634484" y="1302963"/>
+            <a:ext cx="1911149" cy="1059220"/>
           </a:xfrm>
           <a:prstGeom prst="line">
             <a:avLst/>
@@ -3919,15 +3666,16 @@
             </a:extLst>
           </p:cNvPr>
           <p:cNvCxnSpPr>
+            <a:cxnSpLocks/>
             <a:stCxn id="6" idx="0"/>
-            <a:endCxn id="5" idx="5"/>
+            <a:endCxn id="5" idx="4"/>
           </p:cNvCxnSpPr>
           <p:nvPr/>
         </p:nvCxnSpPr>
         <p:spPr>
           <a:xfrm flipH="1" flipV="1">
-            <a:off x="6634484" y="3990490"/>
-            <a:ext cx="1106905" cy="1538695"/>
+            <a:off x="5850875" y="4292867"/>
+            <a:ext cx="12247" cy="1376414"/>
           </a:xfrm>
           <a:prstGeom prst="line">
             <a:avLst/>
@@ -3948,25 +3696,282 @@
           </a:fontRef>
         </p:style>
       </p:cxnSp>
+      <p:pic>
+        <p:nvPicPr>
+          <p:cNvPr id="60" name="Afbeelding 59">
+            <a:extLst>
+              <a:ext uri="{FF2B5EF4-FFF2-40B4-BE49-F238E27FC236}">
+                <a16:creationId xmlns:a16="http://schemas.microsoft.com/office/drawing/2014/main" id="{5125198E-E2FC-4C14-BB16-45FFA9805998}"/>
+              </a:ext>
+            </a:extLst>
+          </p:cNvPr>
+          <p:cNvPicPr>
+            <a:picLocks noChangeAspect="1"/>
+          </p:cNvPicPr>
+          <p:nvPr/>
+        </p:nvPicPr>
+        <p:blipFill>
+          <a:blip r:embed="rId2">
+            <a:extLst>
+              <a:ext uri="{28A0092B-C50C-407E-A947-70E740481C1C}">
+                <a14:useLocalDpi xmlns:a14="http://schemas.microsoft.com/office/drawing/2010/main" val="0"/>
+              </a:ext>
+            </a:extLst>
+          </a:blip>
+          <a:stretch>
+            <a:fillRect/>
+          </a:stretch>
+        </p:blipFill>
+        <p:spPr>
+          <a:xfrm>
+            <a:off x="5085000" y="2429933"/>
+            <a:ext cx="1549484" cy="1514720"/>
+          </a:xfrm>
+          <a:prstGeom prst="rect">
+            <a:avLst/>
+          </a:prstGeom>
+        </p:spPr>
+      </p:pic>
+    </p:spTree>
+    <p:extLst>
+      <p:ext uri="{BB962C8B-B14F-4D97-AF65-F5344CB8AC3E}">
+        <p14:creationId xmlns:p14="http://schemas.microsoft.com/office/powerpoint/2010/main" val="1105295485"/>
+      </p:ext>
+    </p:extLst>
+  </p:cSld>
+  <p:clrMapOvr>
+    <a:masterClrMapping/>
+  </p:clrMapOvr>
+  <mc:AlternateContent xmlns:mc="http://schemas.openxmlformats.org/markup-compatibility/2006" xmlns:p159="http://schemas.microsoft.com/office/powerpoint/2015/09/main">
+    <mc:Choice Requires="p159">
+      <p:transition xmlns:p14="http://schemas.microsoft.com/office/powerpoint/2010/main" spd="slow" p14:dur="2000">
+        <p159:morph option="byObject"/>
+      </p:transition>
+    </mc:Choice>
+    <mc:Fallback xmlns="">
+      <p:transition spd="slow">
+        <p:fade/>
+      </p:transition>
+    </mc:Fallback>
+  </mc:AlternateContent>
+</p:sld>
+</file>
+
+<file path=ppt/slides/slide2.xml><?xml version="1.0" encoding="utf-8"?>
+<p:sld xmlns:a="http://schemas.openxmlformats.org/drawingml/2006/main" xmlns:r="http://schemas.openxmlformats.org/officeDocument/2006/relationships" xmlns:p="http://schemas.openxmlformats.org/presentationml/2006/main">
+  <p:cSld>
+    <p:spTree>
+      <p:nvGrpSpPr>
+        <p:cNvPr id="1" name=""/>
+        <p:cNvGrpSpPr/>
+        <p:nvPr/>
+      </p:nvGrpSpPr>
+      <p:grpSpPr>
+        <a:xfrm>
+          <a:off x="0" y="0"/>
+          <a:ext cx="0" cy="0"/>
+          <a:chOff x="0" y="0"/>
+          <a:chExt cx="0" cy="0"/>
+        </a:xfrm>
+      </p:grpSpPr>
+      <p:sp>
+        <p:nvSpPr>
+          <p:cNvPr id="5" name="Ovaal 4">
+            <a:extLst>
+              <a:ext uri="{FF2B5EF4-FFF2-40B4-BE49-F238E27FC236}">
+                <a16:creationId xmlns:a16="http://schemas.microsoft.com/office/drawing/2014/main" id="{00C81829-2E9A-4C91-B7A1-66B32A2EB1D9}"/>
+              </a:ext>
+            </a:extLst>
+          </p:cNvPr>
+          <p:cNvSpPr/>
+          <p:nvPr/>
+        </p:nvSpPr>
+        <p:spPr>
+          <a:xfrm>
+            <a:off x="4742685" y="2059806"/>
+            <a:ext cx="2216380" cy="2261937"/>
+          </a:xfrm>
+          <a:prstGeom prst="ellipse">
+            <a:avLst/>
+          </a:prstGeom>
+          <a:ln w="38100"/>
+        </p:spPr>
+        <p:style>
+          <a:lnRef idx="2">
+            <a:schemeClr val="dk1"/>
+          </a:lnRef>
+          <a:fillRef idx="1">
+            <a:schemeClr val="lt1"/>
+          </a:fillRef>
+          <a:effectRef idx="0">
+            <a:schemeClr val="dk1"/>
+          </a:effectRef>
+          <a:fontRef idx="minor">
+            <a:schemeClr val="dk1"/>
+          </a:fontRef>
+        </p:style>
+        <p:txBody>
+          <a:bodyPr rtlCol="0" anchor="ctr"/>
+          <a:lstStyle/>
+          <a:p>
+            <a:pPr algn="ctr"/>
+            <a:endParaRPr lang="nl-NL" sz="4000" dirty="0">
+              <a:solidFill>
+                <a:schemeClr val="accent2">
+                  <a:lumMod val="75000"/>
+                </a:schemeClr>
+              </a:solidFill>
+            </a:endParaRPr>
+          </a:p>
+        </p:txBody>
+      </p:sp>
+      <p:sp>
+        <p:nvSpPr>
+          <p:cNvPr id="7" name="Tekstvak 6">
+            <a:extLst>
+              <a:ext uri="{FF2B5EF4-FFF2-40B4-BE49-F238E27FC236}">
+                <a16:creationId xmlns:a16="http://schemas.microsoft.com/office/drawing/2014/main" id="{A9D4C730-4C46-4DDA-853E-7486FDFAD35D}"/>
+              </a:ext>
+            </a:extLst>
+          </p:cNvPr>
+          <p:cNvSpPr txBox="1"/>
+          <p:nvPr/>
+        </p:nvSpPr>
+        <p:spPr>
+          <a:xfrm>
+            <a:off x="4474458" y="341909"/>
+            <a:ext cx="2744487" cy="861774"/>
+          </a:xfrm>
+          <a:prstGeom prst="rect">
+            <a:avLst/>
+          </a:prstGeom>
+          <a:noFill/>
+        </p:spPr>
+        <p:txBody>
+          <a:bodyPr wrap="square" rtlCol="0">
+            <a:spAutoFit/>
+          </a:bodyPr>
+          <a:lstStyle/>
+          <a:p>
+            <a:pPr algn="ctr"/>
+            <a:r>
+              <a:rPr lang="nl-NL" sz="5000" dirty="0">
+                <a:solidFill>
+                  <a:schemeClr val="accent1">
+                    <a:lumMod val="75000"/>
+                  </a:schemeClr>
+                </a:solidFill>
+              </a:rPr>
+              <a:t>Project</a:t>
+            </a:r>
+            <a:endParaRPr lang="nl-NL" sz="5000" dirty="0"/>
+          </a:p>
+        </p:txBody>
+      </p:sp>
+      <p:sp>
+        <p:nvSpPr>
+          <p:cNvPr id="9" name="Tekstvak 8">
+            <a:extLst>
+              <a:ext uri="{FF2B5EF4-FFF2-40B4-BE49-F238E27FC236}">
+                <a16:creationId xmlns:a16="http://schemas.microsoft.com/office/drawing/2014/main" id="{BAFBB04F-DAAC-4828-922E-9A534EDAB5EF}"/>
+              </a:ext>
+            </a:extLst>
+          </p:cNvPr>
+          <p:cNvSpPr txBox="1"/>
+          <p:nvPr/>
+        </p:nvSpPr>
+        <p:spPr>
+          <a:xfrm>
+            <a:off x="8450349" y="5150726"/>
+            <a:ext cx="1982804" cy="553998"/>
+          </a:xfrm>
+          <a:prstGeom prst="rect">
+            <a:avLst/>
+          </a:prstGeom>
+          <a:noFill/>
+        </p:spPr>
+        <p:txBody>
+          <a:bodyPr wrap="square" rtlCol="0">
+            <a:spAutoFit/>
+          </a:bodyPr>
+          <a:lstStyle/>
+          <a:p>
+            <a:r>
+              <a:rPr lang="nl-NL" sz="3000" dirty="0">
+                <a:solidFill>
+                  <a:schemeClr val="accent1">
+                    <a:lumMod val="75000"/>
+                  </a:schemeClr>
+                </a:solidFill>
+              </a:rPr>
+              <a:t>Practicum</a:t>
+            </a:r>
+            <a:endParaRPr lang="nl-NL" dirty="0"/>
+          </a:p>
+        </p:txBody>
+      </p:sp>
+      <p:sp>
+        <p:nvSpPr>
+          <p:cNvPr id="15" name="Tekstvak 14">
+            <a:extLst>
+              <a:ext uri="{FF2B5EF4-FFF2-40B4-BE49-F238E27FC236}">
+                <a16:creationId xmlns:a16="http://schemas.microsoft.com/office/drawing/2014/main" id="{1ADF31B7-DF74-4584-8BFD-D6F03F0333DC}"/>
+              </a:ext>
+            </a:extLst>
+          </p:cNvPr>
+          <p:cNvSpPr txBox="1"/>
+          <p:nvPr/>
+        </p:nvSpPr>
+        <p:spPr>
+          <a:xfrm>
+            <a:off x="1316087" y="5091905"/>
+            <a:ext cx="1982804" cy="553998"/>
+          </a:xfrm>
+          <a:prstGeom prst="rect">
+            <a:avLst/>
+          </a:prstGeom>
+          <a:noFill/>
+        </p:spPr>
+        <p:txBody>
+          <a:bodyPr wrap="square" rtlCol="0">
+            <a:spAutoFit/>
+          </a:bodyPr>
+          <a:lstStyle/>
+          <a:p>
+            <a:r>
+              <a:rPr lang="nl-NL" sz="3000" dirty="0">
+                <a:solidFill>
+                  <a:schemeClr val="accent1">
+                    <a:lumMod val="75000"/>
+                  </a:schemeClr>
+                </a:solidFill>
+              </a:rPr>
+              <a:t>Workshops</a:t>
+            </a:r>
+            <a:endParaRPr lang="nl-NL" dirty="0"/>
+          </a:p>
+        </p:txBody>
+      </p:sp>
       <p:cxnSp>
         <p:nvCxnSpPr>
-          <p:cNvPr id="19" name="Rechte verbindingslijn 18">
-            <a:extLst>
-              <a:ext uri="{FF2B5EF4-FFF2-40B4-BE49-F238E27FC236}">
-                <a16:creationId xmlns:a16="http://schemas.microsoft.com/office/drawing/2014/main" id="{04A2CEE7-5FB2-4D15-8A66-90A2A9F8AAF7}"/>
+          <p:cNvPr id="14" name="Rechte verbindingslijn 13">
+            <a:extLst>
+              <a:ext uri="{FF2B5EF4-FFF2-40B4-BE49-F238E27FC236}">
+                <a16:creationId xmlns:a16="http://schemas.microsoft.com/office/drawing/2014/main" id="{DB7060F0-DB25-47C6-AA5A-5D2565734522}"/>
               </a:ext>
             </a:extLst>
           </p:cNvPr>
           <p:cNvCxnSpPr>
-            <a:stCxn id="8" idx="0"/>
-            <a:endCxn id="5" idx="3"/>
+            <a:cxnSpLocks/>
+            <a:stCxn id="9" idx="1"/>
+            <a:endCxn id="5" idx="5"/>
           </p:cNvCxnSpPr>
           <p:nvPr/>
         </p:nvCxnSpPr>
         <p:spPr>
-          <a:xfrm flipV="1">
-            <a:off x="4185385" y="3990490"/>
-            <a:ext cx="881881" cy="753691"/>
+          <a:xfrm flipH="1" flipV="1">
+            <a:off x="6634484" y="3990490"/>
+            <a:ext cx="1815865" cy="1437235"/>
           </a:xfrm>
           <a:prstGeom prst="line">
             <a:avLst/>
@@ -3997,15 +4002,16 @@
             </a:extLst>
           </p:cNvPr>
           <p:cNvCxnSpPr>
+            <a:cxnSpLocks/>
             <a:stCxn id="15" idx="3"/>
-            <a:endCxn id="5" idx="2"/>
+            <a:endCxn id="5" idx="3"/>
           </p:cNvCxnSpPr>
           <p:nvPr/>
         </p:nvCxnSpPr>
         <p:spPr>
           <a:xfrm flipV="1">
-            <a:off x="4041643" y="3190775"/>
-            <a:ext cx="701042" cy="118645"/>
+            <a:off x="3298891" y="3990490"/>
+            <a:ext cx="1768375" cy="1378414"/>
           </a:xfrm>
           <a:prstGeom prst="line">
             <a:avLst/>
@@ -4036,15 +4042,134 @@
             </a:extLst>
           </p:cNvPr>
           <p:cNvCxnSpPr>
+            <a:cxnSpLocks/>
             <a:stCxn id="7" idx="2"/>
             <a:endCxn id="5" idx="0"/>
           </p:cNvCxnSpPr>
           <p:nvPr/>
         </p:nvCxnSpPr>
         <p:spPr>
-          <a:xfrm flipH="1">
-            <a:off x="5850875" y="1463800"/>
-            <a:ext cx="250256" cy="596006"/>
+          <a:xfrm>
+            <a:off x="5846702" y="1203683"/>
+            <a:ext cx="4173" cy="856123"/>
+          </a:xfrm>
+          <a:prstGeom prst="line">
+            <a:avLst/>
+          </a:prstGeom>
+        </p:spPr>
+        <p:style>
+          <a:lnRef idx="1">
+            <a:schemeClr val="accent1"/>
+          </a:lnRef>
+          <a:fillRef idx="0">
+            <a:schemeClr val="accent1"/>
+          </a:fillRef>
+          <a:effectRef idx="0">
+            <a:schemeClr val="accent1"/>
+          </a:effectRef>
+          <a:fontRef idx="minor">
+            <a:schemeClr val="tx1"/>
+          </a:fontRef>
+        </p:style>
+      </p:cxnSp>
+      <p:pic>
+        <p:nvPicPr>
+          <p:cNvPr id="23" name="Afbeelding 22">
+            <a:extLst>
+              <a:ext uri="{FF2B5EF4-FFF2-40B4-BE49-F238E27FC236}">
+                <a16:creationId xmlns:a16="http://schemas.microsoft.com/office/drawing/2014/main" id="{41E6389A-5E49-4463-BBE5-D5A9DE03DD39}"/>
+              </a:ext>
+            </a:extLst>
+          </p:cNvPr>
+          <p:cNvPicPr>
+            <a:picLocks noChangeAspect="1"/>
+          </p:cNvPicPr>
+          <p:nvPr/>
+        </p:nvPicPr>
+        <p:blipFill>
+          <a:blip r:embed="rId2">
+            <a:extLst>
+              <a:ext uri="{28A0092B-C50C-407E-A947-70E740481C1C}">
+                <a14:useLocalDpi xmlns:a14="http://schemas.microsoft.com/office/drawing/2010/main" val="0"/>
+              </a:ext>
+            </a:extLst>
+          </a:blip>
+          <a:stretch>
+            <a:fillRect/>
+          </a:stretch>
+        </p:blipFill>
+        <p:spPr>
+          <a:xfrm>
+            <a:off x="5085000" y="2429933"/>
+            <a:ext cx="1549484" cy="1514720"/>
+          </a:xfrm>
+          <a:prstGeom prst="rect">
+            <a:avLst/>
+          </a:prstGeom>
+        </p:spPr>
+      </p:pic>
+      <p:sp>
+        <p:nvSpPr>
+          <p:cNvPr id="13" name="Tekstvak 12">
+            <a:extLst>
+              <a:ext uri="{FF2B5EF4-FFF2-40B4-BE49-F238E27FC236}">
+                <a16:creationId xmlns:a16="http://schemas.microsoft.com/office/drawing/2014/main" id="{957F7EA4-7960-418F-9E5F-6B31590E4835}"/>
+              </a:ext>
+            </a:extLst>
+          </p:cNvPr>
+          <p:cNvSpPr txBox="1"/>
+          <p:nvPr/>
+        </p:nvSpPr>
+        <p:spPr>
+          <a:xfrm>
+            <a:off x="279133" y="2152934"/>
+            <a:ext cx="2459889" cy="461665"/>
+          </a:xfrm>
+          <a:prstGeom prst="rect">
+            <a:avLst/>
+          </a:prstGeom>
+          <a:noFill/>
+        </p:spPr>
+        <p:txBody>
+          <a:bodyPr wrap="square" rtlCol="0">
+            <a:spAutoFit/>
+          </a:bodyPr>
+          <a:lstStyle/>
+          <a:p>
+            <a:r>
+              <a:rPr lang="nl-NL" sz="2400" dirty="0">
+                <a:solidFill>
+                  <a:schemeClr val="accent1">
+                    <a:lumMod val="75000"/>
+                  </a:schemeClr>
+                </a:solidFill>
+              </a:rPr>
+              <a:t>gastcolleges</a:t>
+            </a:r>
+            <a:endParaRPr lang="nl-NL" sz="2400" dirty="0"/>
+          </a:p>
+        </p:txBody>
+      </p:sp>
+      <p:cxnSp>
+        <p:nvCxnSpPr>
+          <p:cNvPr id="16" name="Rechte verbindingslijn 15">
+            <a:extLst>
+              <a:ext uri="{FF2B5EF4-FFF2-40B4-BE49-F238E27FC236}">
+                <a16:creationId xmlns:a16="http://schemas.microsoft.com/office/drawing/2014/main" id="{41C7720E-AA49-477C-9810-142DC65CE4E4}"/>
+              </a:ext>
+            </a:extLst>
+          </p:cNvPr>
+          <p:cNvCxnSpPr>
+            <a:cxnSpLocks/>
+            <a:stCxn id="13" idx="3"/>
+            <a:endCxn id="5" idx="2"/>
+          </p:cNvCxnSpPr>
+          <p:nvPr/>
+        </p:nvCxnSpPr>
+        <p:spPr>
+          <a:xfrm>
+            <a:off x="2739022" y="2383767"/>
+            <a:ext cx="2003663" cy="807008"/>
           </a:xfrm>
           <a:prstGeom prst="line">
             <a:avLst/>
@@ -4068,7 +4193,134 @@
     </p:spTree>
     <p:extLst>
       <p:ext uri="{BB962C8B-B14F-4D97-AF65-F5344CB8AC3E}">
-        <p14:creationId xmlns:p14="http://schemas.microsoft.com/office/powerpoint/2010/main" val="1105295485"/>
+        <p14:creationId xmlns:p14="http://schemas.microsoft.com/office/powerpoint/2010/main" val="1991503202"/>
+      </p:ext>
+    </p:extLst>
+  </p:cSld>
+  <p:clrMapOvr>
+    <a:masterClrMapping/>
+  </p:clrMapOvr>
+  <mc:AlternateContent xmlns:mc="http://schemas.openxmlformats.org/markup-compatibility/2006" xmlns:p14="http://schemas.microsoft.com/office/powerpoint/2010/main">
+    <mc:Choice Requires="p14">
+      <p:transition spd="med" p14:dur="700">
+        <p:fade/>
+      </p:transition>
+    </mc:Choice>
+    <mc:Fallback xmlns="">
+      <p:transition spd="med">
+        <p:fade/>
+      </p:transition>
+    </mc:Fallback>
+  </mc:AlternateContent>
+</p:sld>
+</file>
+
+<file path=ppt/slides/slide3.xml><?xml version="1.0" encoding="utf-8"?>
+<p:sld xmlns:a="http://schemas.openxmlformats.org/drawingml/2006/main" xmlns:r="http://schemas.openxmlformats.org/officeDocument/2006/relationships" xmlns:p="http://schemas.openxmlformats.org/presentationml/2006/main">
+  <p:cSld>
+    <p:spTree>
+      <p:nvGrpSpPr>
+        <p:cNvPr id="1" name=""/>
+        <p:cNvGrpSpPr/>
+        <p:nvPr/>
+      </p:nvGrpSpPr>
+      <p:grpSpPr>
+        <a:xfrm>
+          <a:off x="0" y="0"/>
+          <a:ext cx="0" cy="0"/>
+          <a:chOff x="0" y="0"/>
+          <a:chExt cx="0" cy="0"/>
+        </a:xfrm>
+      </p:grpSpPr>
+      <p:sp>
+        <p:nvSpPr>
+          <p:cNvPr id="7" name="Tekstvak 6">
+            <a:hlinkClick r:id="rId2"/>
+            <a:extLst>
+              <a:ext uri="{FF2B5EF4-FFF2-40B4-BE49-F238E27FC236}">
+                <a16:creationId xmlns:a16="http://schemas.microsoft.com/office/drawing/2014/main" id="{95E6811D-B61B-45AA-92BD-36521BA7AF9B}"/>
+              </a:ext>
+            </a:extLst>
+          </p:cNvPr>
+          <p:cNvSpPr txBox="1"/>
+          <p:nvPr/>
+        </p:nvSpPr>
+        <p:spPr>
+          <a:xfrm>
+            <a:off x="1700545" y="2319772"/>
+            <a:ext cx="4939364" cy="461665"/>
+          </a:xfrm>
+          <a:prstGeom prst="rect">
+            <a:avLst/>
+          </a:prstGeom>
+          <a:noFill/>
+        </p:spPr>
+        <p:txBody>
+          <a:bodyPr wrap="square" rtlCol="0">
+            <a:spAutoFit/>
+          </a:bodyPr>
+          <a:lstStyle/>
+          <a:p>
+            <a:r>
+              <a:rPr lang="nl-NL" sz="2400" dirty="0"/>
+              <a:t>Zelf Rijdende Auto</a:t>
+            </a:r>
+          </a:p>
+        </p:txBody>
+      </p:sp>
+      <p:sp>
+        <p:nvSpPr>
+          <p:cNvPr id="9" name="Tekstvak 8">
+            <a:hlinkClick r:id="rId3" action="ppaction://hlinkfile"/>
+            <a:extLst>
+              <a:ext uri="{FF2B5EF4-FFF2-40B4-BE49-F238E27FC236}">
+                <a16:creationId xmlns:a16="http://schemas.microsoft.com/office/drawing/2014/main" id="{5A26A3EE-10C6-4DD7-99C8-241E03E7BBF2}"/>
+              </a:ext>
+            </a:extLst>
+          </p:cNvPr>
+          <p:cNvSpPr txBox="1"/>
+          <p:nvPr/>
+        </p:nvSpPr>
+        <p:spPr>
+          <a:xfrm>
+            <a:off x="1825591" y="3843531"/>
+            <a:ext cx="6326203" cy="461665"/>
+          </a:xfrm>
+          <a:prstGeom prst="rect">
+            <a:avLst/>
+          </a:prstGeom>
+          <a:noFill/>
+        </p:spPr>
+        <p:txBody>
+          <a:bodyPr wrap="square" rtlCol="0">
+            <a:spAutoFit/>
+          </a:bodyPr>
+          <a:lstStyle/>
+          <a:p>
+            <a:r>
+              <a:rPr lang="nl-NL" sz="2400" dirty="0"/>
+              <a:t>Appels Keuren met Computer </a:t>
+            </a:r>
+            <a:r>
+              <a:rPr lang="nl-NL" sz="2400" dirty="0" err="1"/>
+              <a:t>Vision</a:t>
+            </a:r>
+            <a:r>
+              <a:rPr lang="nl-NL" sz="2400" dirty="0"/>
+              <a:t> en </a:t>
+            </a:r>
+            <a:r>
+              <a:rPr lang="nl-NL" sz="2400" dirty="0" err="1"/>
+              <a:t>Chatbot</a:t>
+            </a:r>
+            <a:endParaRPr lang="nl-NL" sz="2400" dirty="0"/>
+          </a:p>
+        </p:txBody>
+      </p:sp>
+    </p:spTree>
+    <p:extLst>
+      <p:ext uri="{BB962C8B-B14F-4D97-AF65-F5344CB8AC3E}">
+        <p14:creationId xmlns:p14="http://schemas.microsoft.com/office/powerpoint/2010/main" val="1072145376"/>
       </p:ext>
     </p:extLst>
   </p:cSld>
@@ -4078,7 +4330,7 @@
 </p:sld>
 </file>
 
-<file path=ppt/slides/slide2.xml><?xml version="1.0" encoding="utf-8"?>
+<file path=ppt/slides/slide4.xml><?xml version="1.0" encoding="utf-8"?>
 <p:sld xmlns:a="http://schemas.openxmlformats.org/drawingml/2006/main" xmlns:r="http://schemas.openxmlformats.org/officeDocument/2006/relationships" xmlns:p="http://schemas.openxmlformats.org/presentationml/2006/main">
   <p:cSld>
     <p:spTree>
@@ -4142,9 +4394,9 @@
           <a:bodyPr rtlCol="0" anchor="ctr"/>
           <a:lstStyle/>
           <a:p>
-            <a:pPr marL="285750" indent="-285750">
-              <a:buFontTx/>
-              <a:buChar char="-"/>
+            <a:pPr marL="457200" indent="-457200">
+              <a:buFont typeface="Arial" panose="020B0604020202020204" pitchFamily="34" charset="0"/>
+              <a:buChar char="•"/>
             </a:pPr>
             <a:r>
               <a:rPr lang="nl-NL" sz="3000" b="1" dirty="0"/>
@@ -4152,9 +4404,9 @@
             </a:r>
           </a:p>
           <a:p>
-            <a:pPr marL="285750" indent="-285750">
-              <a:buFontTx/>
-              <a:buChar char="-"/>
+            <a:pPr marL="457200" indent="-457200">
+              <a:buFont typeface="Arial" panose="020B0604020202020204" pitchFamily="34" charset="0"/>
+              <a:buChar char="•"/>
             </a:pPr>
             <a:r>
               <a:rPr lang="nl-NL" sz="3000" b="1" dirty="0"/>
@@ -4167,9 +4419,9 @@
             <a:endParaRPr lang="nl-NL" sz="3000" b="1" dirty="0"/>
           </a:p>
           <a:p>
-            <a:pPr marL="285750" indent="-285750">
-              <a:buFontTx/>
-              <a:buChar char="-"/>
+            <a:pPr marL="457200" indent="-457200">
+              <a:buFont typeface="Arial" panose="020B0604020202020204" pitchFamily="34" charset="0"/>
+              <a:buChar char="•"/>
             </a:pPr>
             <a:r>
               <a:rPr lang="nl-NL" sz="3000" b="1" dirty="0"/>
@@ -4202,8 +4454,17 @@
             <a:schemeClr val="accent4">
               <a:lumMod val="40000"/>
               <a:lumOff val="60000"/>
+              <a:alpha val="82000"/>
             </a:schemeClr>
           </a:solidFill>
+          <a:ln>
+            <a:solidFill>
+              <a:schemeClr val="accent1">
+                <a:shade val="50000"/>
+                <a:alpha val="84000"/>
+              </a:schemeClr>
+            </a:solidFill>
+          </a:ln>
         </p:spPr>
         <p:style>
           <a:lnRef idx="2">
@@ -4225,18 +4486,12 @@
           <a:bodyPr rtlCol="0" anchor="ctr"/>
           <a:lstStyle/>
           <a:p>
-            <a:r>
-              <a:rPr lang="nl-NL" sz="2400" dirty="0">
-                <a:solidFill>
-                  <a:schemeClr val="bg2">
-                    <a:lumMod val="50000"/>
-                  </a:schemeClr>
-                </a:solidFill>
-              </a:rPr>
-              <a:t>- </a:t>
-            </a:r>
-            <a:r>
-              <a:rPr lang="nl-NL" sz="3000" dirty="0" err="1">
+            <a:pPr marL="342900" indent="-342900">
+              <a:buFont typeface="Arial" panose="020B0604020202020204" pitchFamily="34" charset="0"/>
+              <a:buChar char="•"/>
+            </a:pPr>
+            <a:r>
+              <a:rPr lang="nl-NL" sz="3000" b="1" dirty="0" err="1">
                 <a:solidFill>
                   <a:schemeClr val="bg2">
                     <a:lumMod val="50000"/>
@@ -4245,7 +4500,7 @@
               </a:rPr>
               <a:t>Datapipelines</a:t>
             </a:r>
-            <a:endParaRPr lang="nl-NL" sz="3000" dirty="0">
+            <a:endParaRPr lang="nl-NL" sz="3000" b="1" dirty="0">
               <a:solidFill>
                 <a:schemeClr val="bg2">
                   <a:lumMod val="50000"/>
@@ -4255,11 +4510,11 @@
           </a:p>
           <a:p>
             <a:pPr marL="342900" indent="-342900">
-              <a:buFontTx/>
-              <a:buChar char="-"/>
+              <a:buFont typeface="Arial" panose="020B0604020202020204" pitchFamily="34" charset="0"/>
+              <a:buChar char="•"/>
             </a:pPr>
             <a:r>
-              <a:rPr lang="nl-NL" sz="3000" dirty="0">
+              <a:rPr lang="nl-NL" sz="3000" b="1" dirty="0">
                 <a:solidFill>
                   <a:schemeClr val="bg2">
                     <a:lumMod val="50000"/>
@@ -4271,11 +4526,11 @@
           </a:p>
           <a:p>
             <a:pPr marL="342900" indent="-342900">
-              <a:buFontTx/>
-              <a:buChar char="-"/>
+              <a:buFont typeface="Arial" panose="020B0604020202020204" pitchFamily="34" charset="0"/>
+              <a:buChar char="•"/>
             </a:pPr>
             <a:r>
-              <a:rPr lang="nl-NL" sz="3000" dirty="0">
+              <a:rPr lang="nl-NL" sz="3000" b="1" dirty="0">
                 <a:solidFill>
                   <a:schemeClr val="bg2">
                     <a:lumMod val="50000"/>
@@ -4301,7 +4556,7 @@
         </p:nvSpPr>
         <p:spPr>
           <a:xfrm>
-            <a:off x="4456494" y="0"/>
+            <a:off x="4435473" y="52548"/>
             <a:ext cx="6776185" cy="553998"/>
           </a:xfrm>
           <a:prstGeom prst="rect">
@@ -4346,8 +4601,17 @@
             <a:schemeClr val="accent2">
               <a:lumMod val="60000"/>
               <a:lumOff val="40000"/>
+              <a:alpha val="90000"/>
             </a:schemeClr>
           </a:solidFill>
+          <a:ln>
+            <a:solidFill>
+              <a:schemeClr val="accent1">
+                <a:shade val="50000"/>
+                <a:alpha val="83000"/>
+              </a:schemeClr>
+            </a:solidFill>
+          </a:ln>
         </p:spPr>
         <p:style>
           <a:lnRef idx="2">
@@ -4369,9 +4633,9 @@
           <a:bodyPr rtlCol="0" anchor="ctr"/>
           <a:lstStyle/>
           <a:p>
-            <a:pPr marL="285750" indent="-285750" algn="ctr">
-              <a:buFontTx/>
-              <a:buChar char="-"/>
+            <a:pPr marL="457200" indent="-457200" algn="ctr">
+              <a:buFont typeface="Arial" panose="020B0604020202020204" pitchFamily="34" charset="0"/>
+              <a:buChar char="•"/>
             </a:pPr>
             <a:r>
               <a:rPr lang="nl-NL" sz="3000" b="1" dirty="0">
@@ -4379,13 +4643,13 @@
                   <a:schemeClr val="bg1"/>
                 </a:solidFill>
               </a:rPr>
-              <a:t>Testen code</a:t>
-            </a:r>
-          </a:p>
-          <a:p>
-            <a:pPr marL="342900" indent="-342900" algn="ctr">
-              <a:buFontTx/>
-              <a:buChar char="-"/>
+              <a:t>Code Testen</a:t>
+            </a:r>
+          </a:p>
+          <a:p>
+            <a:pPr marL="457200" indent="-457200" algn="ctr">
+              <a:buFont typeface="Arial" panose="020B0604020202020204" pitchFamily="34" charset="0"/>
+              <a:buChar char="•"/>
             </a:pPr>
             <a:r>
               <a:rPr lang="nl-NL" sz="3000" b="1" dirty="0">
@@ -4395,23 +4659,6 @@
               </a:rPr>
               <a:t>AI modellen</a:t>
             </a:r>
-          </a:p>
-          <a:p>
-            <a:pPr lvl="1" algn="ctr"/>
-            <a:r>
-              <a:rPr lang="nl-NL" sz="3000" b="1" dirty="0">
-                <a:solidFill>
-                  <a:schemeClr val="bg1"/>
-                </a:solidFill>
-              </a:rPr>
-              <a:t>ML/NLP</a:t>
-            </a:r>
-          </a:p>
-          <a:p>
-            <a:pPr marL="342900" indent="-342900" algn="ctr">
-              <a:buFontTx/>
-              <a:buChar char="-"/>
-            </a:pPr>
             <a:endParaRPr lang="nl-NL" sz="2400" b="1" dirty="0">
               <a:solidFill>
                 <a:schemeClr val="bg1"/>
@@ -4447,8 +4694,8 @@
         </p:nvSpPr>
         <p:spPr>
           <a:xfrm>
-            <a:off x="1376413" y="1013676"/>
-            <a:ext cx="2216380" cy="430887"/>
+            <a:off x="1072054" y="824494"/>
+            <a:ext cx="2772986" cy="615553"/>
           </a:xfrm>
           <a:prstGeom prst="rect">
             <a:avLst/>
@@ -4462,7 +4709,7 @@
           <a:lstStyle/>
           <a:p>
             <a:r>
-              <a:rPr lang="nl-NL" sz="2200" dirty="0"/>
+              <a:rPr lang="nl-NL" sz="3400" dirty="0"/>
               <a:t>Redelijke basis</a:t>
             </a:r>
           </a:p>
@@ -4482,8 +4729,8 @@
         </p:nvSpPr>
         <p:spPr>
           <a:xfrm>
-            <a:off x="5402815" y="1108029"/>
-            <a:ext cx="2216380" cy="430887"/>
+            <a:off x="5119036" y="971395"/>
+            <a:ext cx="2944147" cy="615553"/>
           </a:xfrm>
           <a:prstGeom prst="rect">
             <a:avLst/>
@@ -4497,7 +4744,7 @@
           <a:lstStyle/>
           <a:p>
             <a:r>
-              <a:rPr lang="nl-NL" sz="2200" dirty="0"/>
+              <a:rPr lang="nl-NL" sz="3400" dirty="0"/>
               <a:t>Flink bijgeleerd</a:t>
             </a:r>
           </a:p>
@@ -4517,8 +4764,8 @@
         </p:nvSpPr>
         <p:spPr>
           <a:xfrm>
-            <a:off x="8887094" y="1141723"/>
-            <a:ext cx="2216380" cy="430887"/>
+            <a:off x="8666378" y="1078661"/>
+            <a:ext cx="3502232" cy="615553"/>
           </a:xfrm>
           <a:prstGeom prst="rect">
             <a:avLst/>
@@ -4532,7 +4779,7 @@
           <a:lstStyle/>
           <a:p>
             <a:r>
-              <a:rPr lang="nl-NL" sz="2200" dirty="0"/>
+              <a:rPr lang="nl-NL" sz="3400" dirty="0"/>
               <a:t>Compleet nieuw</a:t>
             </a:r>
           </a:p>
@@ -4548,6 +4795,18 @@
   <p:clrMapOvr>
     <a:masterClrMapping/>
   </p:clrMapOvr>
+  <mc:AlternateContent xmlns:mc="http://schemas.openxmlformats.org/markup-compatibility/2006" xmlns:p159="http://schemas.microsoft.com/office/powerpoint/2015/09/main">
+    <mc:Choice Requires="p159">
+      <p:transition xmlns:p14="http://schemas.microsoft.com/office/powerpoint/2010/main" spd="slow" p14:dur="2000">
+        <p159:morph option="byObject"/>
+      </p:transition>
+    </mc:Choice>
+    <mc:Fallback xmlns="">
+      <p:transition spd="slow">
+        <p:fade/>
+      </p:transition>
+    </mc:Fallback>
+  </mc:AlternateContent>
   <p:timing>
     <p:tnLst>
       <p:par>
@@ -4772,7 +5031,7 @@
 </p:sld>
 </file>
 
-<file path=ppt/slides/slide3.xml><?xml version="1.0" encoding="utf-8"?>
+<file path=ppt/slides/slide5.xml><?xml version="1.0" encoding="utf-8"?>
 <p:sld xmlns:a="http://schemas.openxmlformats.org/drawingml/2006/main" xmlns:r="http://schemas.openxmlformats.org/officeDocument/2006/relationships" xmlns:p="http://schemas.openxmlformats.org/presentationml/2006/main">
   <p:cSld>
     <p:spTree>
@@ -4791,158 +5050,6 @@
       </p:grpSpPr>
       <p:sp>
         <p:nvSpPr>
-          <p:cNvPr id="7" name="Tekstvak 6">
-            <a:extLst>
-              <a:ext uri="{FF2B5EF4-FFF2-40B4-BE49-F238E27FC236}">
-                <a16:creationId xmlns:a16="http://schemas.microsoft.com/office/drawing/2014/main" id="{95E6811D-B61B-45AA-92BD-36521BA7AF9B}"/>
-              </a:ext>
-            </a:extLst>
-          </p:cNvPr>
-          <p:cNvSpPr txBox="1"/>
-          <p:nvPr/>
-        </p:nvSpPr>
-        <p:spPr>
-          <a:xfrm>
-            <a:off x="1722922" y="798898"/>
-            <a:ext cx="2714324" cy="830997"/>
-          </a:xfrm>
-          <a:prstGeom prst="rect">
-            <a:avLst/>
-          </a:prstGeom>
-          <a:noFill/>
-        </p:spPr>
-        <p:txBody>
-          <a:bodyPr wrap="square" rtlCol="0">
-            <a:spAutoFit/>
-          </a:bodyPr>
-          <a:lstStyle/>
-          <a:p>
-            <a:r>
-              <a:rPr lang="nl-NL" sz="2400" dirty="0"/>
-              <a:t>Project </a:t>
-            </a:r>
-          </a:p>
-          <a:p>
-            <a:r>
-              <a:rPr lang="nl-NL" sz="2400" dirty="0"/>
-              <a:t>Zelf Rijdende Auto</a:t>
-            </a:r>
-          </a:p>
-        </p:txBody>
-      </p:sp>
-      <p:sp>
-        <p:nvSpPr>
-          <p:cNvPr id="9" name="Tekstvak 8">
-            <a:extLst>
-              <a:ext uri="{FF2B5EF4-FFF2-40B4-BE49-F238E27FC236}">
-                <a16:creationId xmlns:a16="http://schemas.microsoft.com/office/drawing/2014/main" id="{5A26A3EE-10C6-4DD7-99C8-241E03E7BBF2}"/>
-              </a:ext>
-            </a:extLst>
-          </p:cNvPr>
-          <p:cNvSpPr txBox="1"/>
-          <p:nvPr/>
-        </p:nvSpPr>
-        <p:spPr>
-          <a:xfrm>
-            <a:off x="7198092" y="3429000"/>
-            <a:ext cx="2714324" cy="830997"/>
-          </a:xfrm>
-          <a:prstGeom prst="rect">
-            <a:avLst/>
-          </a:prstGeom>
-          <a:noFill/>
-        </p:spPr>
-        <p:txBody>
-          <a:bodyPr wrap="square" rtlCol="0">
-            <a:spAutoFit/>
-          </a:bodyPr>
-          <a:lstStyle/>
-          <a:p>
-            <a:r>
-              <a:rPr lang="nl-NL" sz="2400" dirty="0"/>
-              <a:t>Appelkeuring met </a:t>
-            </a:r>
-            <a:r>
-              <a:rPr lang="nl-NL" sz="2400" dirty="0" err="1"/>
-              <a:t>Chatbot</a:t>
-            </a:r>
-            <a:endParaRPr lang="nl-NL" sz="2400" dirty="0"/>
-          </a:p>
-        </p:txBody>
-      </p:sp>
-      <p:sp>
-        <p:nvSpPr>
-          <p:cNvPr id="11" name="Tekstvak 10">
-            <a:extLst>
-              <a:ext uri="{FF2B5EF4-FFF2-40B4-BE49-F238E27FC236}">
-                <a16:creationId xmlns:a16="http://schemas.microsoft.com/office/drawing/2014/main" id="{5505C573-0C1A-492B-A5DC-81CFC310A697}"/>
-              </a:ext>
-            </a:extLst>
-          </p:cNvPr>
-          <p:cNvSpPr txBox="1"/>
-          <p:nvPr/>
-        </p:nvSpPr>
-        <p:spPr>
-          <a:xfrm>
-            <a:off x="2298031" y="1629895"/>
-            <a:ext cx="6097604" cy="646331"/>
-          </a:xfrm>
-          <a:prstGeom prst="rect">
-            <a:avLst/>
-          </a:prstGeom>
-          <a:noFill/>
-        </p:spPr>
-        <p:txBody>
-          <a:bodyPr wrap="square">
-            <a:spAutoFit/>
-          </a:bodyPr>
-          <a:lstStyle/>
-          <a:p>
-            <a:r>
-              <a:rPr lang="nl-NL" dirty="0">
-                <a:hlinkClick r:id="rId2"/>
-              </a:rPr>
-              <a:t>https://www.youtube.com/watch?v=0zvwldcYlKU&amp;t=4s</a:t>
-            </a:r>
-            <a:endParaRPr lang="nl-NL" dirty="0"/>
-          </a:p>
-          <a:p>
-            <a:endParaRPr lang="nl-NL" dirty="0"/>
-          </a:p>
-        </p:txBody>
-      </p:sp>
-    </p:spTree>
-    <p:extLst>
-      <p:ext uri="{BB962C8B-B14F-4D97-AF65-F5344CB8AC3E}">
-        <p14:creationId xmlns:p14="http://schemas.microsoft.com/office/powerpoint/2010/main" val="1072145376"/>
-      </p:ext>
-    </p:extLst>
-  </p:cSld>
-  <p:clrMapOvr>
-    <a:masterClrMapping/>
-  </p:clrMapOvr>
-</p:sld>
-</file>
-
-<file path=ppt/slides/slide4.xml><?xml version="1.0" encoding="utf-8"?>
-<p:sld xmlns:a="http://schemas.openxmlformats.org/drawingml/2006/main" xmlns:r="http://schemas.openxmlformats.org/officeDocument/2006/relationships" xmlns:p="http://schemas.openxmlformats.org/presentationml/2006/main">
-  <p:cSld>
-    <p:spTree>
-      <p:nvGrpSpPr>
-        <p:cNvPr id="1" name=""/>
-        <p:cNvGrpSpPr/>
-        <p:nvPr/>
-      </p:nvGrpSpPr>
-      <p:grpSpPr>
-        <a:xfrm>
-          <a:off x="0" y="0"/>
-          <a:ext cx="0" cy="0"/>
-          <a:chOff x="0" y="0"/>
-          <a:chExt cx="0" cy="0"/>
-        </a:xfrm>
-      </p:grpSpPr>
-      <p:sp>
-        <p:nvSpPr>
           <p:cNvPr id="2" name="Titel 1">
             <a:extLst>
               <a:ext uri="{FF2B5EF4-FFF2-40B4-BE49-F238E27FC236}">
@@ -4990,7 +5097,7 @@
         </p:nvSpPr>
         <p:spPr>
           <a:xfrm>
-            <a:off x="577516" y="1476117"/>
+            <a:off x="621583" y="1465100"/>
             <a:ext cx="10515600" cy="4801314"/>
           </a:xfrm>
           <a:prstGeom prst="rect">
@@ -5054,7 +5161,7 @@
           <a:p>
             <a:r>
               <a:rPr lang="nl-NL" sz="3400" dirty="0"/>
-              <a:t>	In een projectgroep werken. </a:t>
+              <a:t>	In een projectgroep werken.</a:t>
             </a:r>
           </a:p>
         </p:txBody>

</xml_diff>